<commit_message>
updated intro.pptx small change
</commit_message>
<xml_diff>
--- a/IBM6510/Intro.pptx
+++ b/IBM6510/Intro.pptx
@@ -13,11 +13,11 @@
     <p:sldId id="326" r:id="rId4"/>
     <p:sldId id="328" r:id="rId5"/>
     <p:sldId id="330" r:id="rId6"/>
-    <p:sldId id="331" r:id="rId7"/>
-    <p:sldId id="312" r:id="rId8"/>
-    <p:sldId id="342" r:id="rId9"/>
-    <p:sldId id="343" r:id="rId10"/>
-    <p:sldId id="336" r:id="rId11"/>
+    <p:sldId id="336" r:id="rId7"/>
+    <p:sldId id="331" r:id="rId8"/>
+    <p:sldId id="312" r:id="rId9"/>
+    <p:sldId id="342" r:id="rId10"/>
+    <p:sldId id="343" r:id="rId11"/>
     <p:sldId id="337" r:id="rId12"/>
     <p:sldId id="340" r:id="rId13"/>
   </p:sldIdLst>
@@ -492,7 +492,7 @@
   <pc:docChgLst>
     <pc:chgData name="Carsten Lange" userId="80c75f9e-e948-40a6-94e4-2b6090569fc7" providerId="ADAL" clId="{1544F6ED-40D6-4534-9700-0F3F288DD22F}"/>
     <pc:docChg chg="undo custSel addSld delSld modSld">
-      <pc:chgData name="Carsten Lange" userId="80c75f9e-e948-40a6-94e4-2b6090569fc7" providerId="ADAL" clId="{1544F6ED-40D6-4534-9700-0F3F288DD22F}" dt="2024-08-27T18:45:35.370" v="689"/>
+      <pc:chgData name="Carsten Lange" userId="80c75f9e-e948-40a6-94e4-2b6090569fc7" providerId="ADAL" clId="{1544F6ED-40D6-4534-9700-0F3F288DD22F}" dt="2024-08-28T00:43:09.112" v="691"/>
       <pc:docMkLst>
         <pc:docMk/>
       </pc:docMkLst>
@@ -536,6 +536,20 @@
         <pc:sldMkLst>
           <pc:docMk/>
           <pc:sldMk cId="236199630" sldId="335"/>
+        </pc:sldMkLst>
+      </pc:sldChg>
+      <pc:sldChg chg="del">
+        <pc:chgData name="Carsten Lange" userId="80c75f9e-e948-40a6-94e4-2b6090569fc7" providerId="ADAL" clId="{1544F6ED-40D6-4534-9700-0F3F288DD22F}" dt="2024-08-28T00:42:42.473" v="690" actId="2696"/>
+        <pc:sldMkLst>
+          <pc:docMk/>
+          <pc:sldMk cId="113937254" sldId="336"/>
+        </pc:sldMkLst>
+      </pc:sldChg>
+      <pc:sldChg chg="add">
+        <pc:chgData name="Carsten Lange" userId="80c75f9e-e948-40a6-94e4-2b6090569fc7" providerId="ADAL" clId="{1544F6ED-40D6-4534-9700-0F3F288DD22F}" dt="2024-08-28T00:43:09.112" v="691"/>
+        <pc:sldMkLst>
+          <pc:docMk/>
+          <pc:sldMk cId="820470024" sldId="336"/>
         </pc:sldMkLst>
       </pc:sldChg>
       <pc:sldChg chg="modSp mod">
@@ -1320,7 +1334,7 @@
                   <a:spcPct val="0"/>
                 </a:spcBef>
               </a:pPr>
-              <a:t>7</a:t>
+              <a:t>8</a:t>
             </a:fld>
             <a:endParaRPr lang="de-DE" altLang="en-US"/>
           </a:p>
@@ -6087,7 +6101,448 @@
       </p:grpSpPr>
       <p:sp>
         <p:nvSpPr>
-          <p:cNvPr id="6" name="Slide Number Placeholder 5"/>
+          <p:cNvPr id="2" name="Title 1">
+            <a:extLst>
+              <a:ext uri="{FF2B5EF4-FFF2-40B4-BE49-F238E27FC236}">
+                <a16:creationId xmlns:a16="http://schemas.microsoft.com/office/drawing/2014/main" id="{BAEE0C04-A2D2-4995-749D-62DDB4AF8D8D}"/>
+              </a:ext>
+            </a:extLst>
+          </p:cNvPr>
+          <p:cNvSpPr>
+            <a:spLocks noGrp="1"/>
+          </p:cNvSpPr>
+          <p:nvPr>
+            <p:ph type="title"/>
+          </p:nvPr>
+        </p:nvSpPr>
+        <p:spPr/>
+        <p:txBody>
+          <a:bodyPr/>
+          <a:lstStyle/>
+          <a:p>
+            <a:r>
+              <a:rPr lang="en-US" dirty="0"/>
+              <a:t>Another Example</a:t>
+            </a:r>
+          </a:p>
+        </p:txBody>
+      </p:sp>
+      <p:sp>
+        <p:nvSpPr>
+          <p:cNvPr id="3" name="Content Placeholder 2">
+            <a:extLst>
+              <a:ext uri="{FF2B5EF4-FFF2-40B4-BE49-F238E27FC236}">
+                <a16:creationId xmlns:a16="http://schemas.microsoft.com/office/drawing/2014/main" id="{1995FF6D-1F05-00F0-9DF2-B5472C06F416}"/>
+              </a:ext>
+            </a:extLst>
+          </p:cNvPr>
+          <p:cNvSpPr>
+            <a:spLocks noGrp="1"/>
+          </p:cNvSpPr>
+          <p:nvPr>
+            <p:ph sz="half" idx="1"/>
+          </p:nvPr>
+        </p:nvSpPr>
+        <p:spPr/>
+        <p:txBody>
+          <a:bodyPr/>
+          <a:lstStyle/>
+          <a:p>
+            <a:pPr marL="0" indent="0" algn="l">
+              <a:buNone/>
+            </a:pPr>
+            <a:r>
+              <a:rPr lang="en-US" sz="1800" b="0" i="0" u="none" strike="noStrike" baseline="0" dirty="0">
+                <a:solidFill>
+                  <a:srgbClr val="05297D"/>
+                </a:solidFill>
+                <a:latin typeface="SourceCodePro-Regular-Identity-H"/>
+              </a:rPr>
+              <a:t>library(</a:t>
+            </a:r>
+            <a:r>
+              <a:rPr lang="en-US" sz="1800" b="0" i="0" u="none" strike="noStrike" baseline="0" dirty="0" err="1">
+                <a:solidFill>
+                  <a:srgbClr val="05297D"/>
+                </a:solidFill>
+                <a:latin typeface="SourceCodePro-Regular-Identity-H"/>
+              </a:rPr>
+              <a:t>tidyverse</a:t>
+            </a:r>
+            <a:r>
+              <a:rPr lang="en-US" sz="1800" b="0" i="0" u="none" strike="noStrike" baseline="0" dirty="0">
+                <a:solidFill>
+                  <a:srgbClr val="05297D"/>
+                </a:solidFill>
+                <a:latin typeface="SourceCodePro-Regular-Identity-H"/>
+              </a:rPr>
+              <a:t>);library(</a:t>
+            </a:r>
+            <a:r>
+              <a:rPr lang="en-US" sz="1800" b="0" i="0" u="none" strike="noStrike" baseline="0" dirty="0" err="1">
+                <a:solidFill>
+                  <a:srgbClr val="05297D"/>
+                </a:solidFill>
+                <a:latin typeface="SourceCodePro-Regular-Identity-H"/>
+              </a:rPr>
+              <a:t>rio</a:t>
+            </a:r>
+            <a:r>
+              <a:rPr lang="en-US" sz="1800" b="0" i="0" u="none" strike="noStrike" baseline="0" dirty="0">
+                <a:solidFill>
+                  <a:srgbClr val="05297D"/>
+                </a:solidFill>
+                <a:latin typeface="SourceCodePro-Regular-Identity-H"/>
+              </a:rPr>
+              <a:t>);library(janitor);  </a:t>
+            </a:r>
+            <a:r>
+              <a:rPr lang="en-US" sz="1800" b="0" i="0" u="none" strike="noStrike" baseline="0" dirty="0" err="1">
+                <a:solidFill>
+                  <a:srgbClr val="05297D"/>
+                </a:solidFill>
+                <a:latin typeface="SourceCodePro-Regular-Identity-H"/>
+              </a:rPr>
+              <a:t>DataHousing</a:t>
+            </a:r>
+            <a:r>
+              <a:rPr lang="en-US" sz="1800" b="0" i="0" u="none" strike="noStrike" baseline="0" dirty="0">
+                <a:solidFill>
+                  <a:srgbClr val="05297D"/>
+                </a:solidFill>
+                <a:latin typeface="SourceCodePro-Regular-Identity-H"/>
+              </a:rPr>
+              <a:t> =import("https://ai.lange-analytics.com/data/HousingData.csv") |&gt;</a:t>
+            </a:r>
+          </a:p>
+          <a:p>
+            <a:pPr marL="0" indent="0" algn="l">
+              <a:buNone/>
+            </a:pPr>
+            <a:r>
+              <a:rPr lang="en-US" sz="1800" b="0" i="0" u="none" strike="noStrike" baseline="0" dirty="0" err="1">
+                <a:solidFill>
+                  <a:srgbClr val="05297D"/>
+                </a:solidFill>
+                <a:latin typeface="SourceCodePro-Regular-Identity-H"/>
+              </a:rPr>
+              <a:t>clean_names</a:t>
+            </a:r>
+            <a:r>
+              <a:rPr lang="en-US" sz="1800" b="0" i="0" u="none" strike="noStrike" baseline="0" dirty="0">
+                <a:solidFill>
+                  <a:srgbClr val="05297D"/>
+                </a:solidFill>
+                <a:latin typeface="SourceCodePro-Regular-Identity-H"/>
+              </a:rPr>
+              <a:t>("</a:t>
+            </a:r>
+            <a:r>
+              <a:rPr lang="en-US" sz="1800" b="0" i="0" u="none" strike="noStrike" baseline="0" dirty="0" err="1">
+                <a:solidFill>
+                  <a:srgbClr val="05297D"/>
+                </a:solidFill>
+                <a:latin typeface="SourceCodePro-Regular-Identity-H"/>
+              </a:rPr>
+              <a:t>upper_camel</a:t>
+            </a:r>
+            <a:r>
+              <a:rPr lang="en-US" sz="1800" b="0" i="0" u="none" strike="noStrike" baseline="0" dirty="0">
+                <a:solidFill>
+                  <a:srgbClr val="05297D"/>
+                </a:solidFill>
+                <a:latin typeface="SourceCodePro-Regular-Identity-H"/>
+              </a:rPr>
+              <a:t>") |&gt;</a:t>
+            </a:r>
+          </a:p>
+          <a:p>
+            <a:pPr marL="0" indent="0" algn="l">
+              <a:buNone/>
+            </a:pPr>
+            <a:r>
+              <a:rPr lang="en-US" sz="1800" b="0" i="0" u="none" strike="noStrike" baseline="0" dirty="0">
+                <a:solidFill>
+                  <a:srgbClr val="05297D"/>
+                </a:solidFill>
+                <a:latin typeface="SourceCodePro-Regular-Identity-H"/>
+              </a:rPr>
+              <a:t>select(Price, </a:t>
+            </a:r>
+            <a:r>
+              <a:rPr lang="en-US" sz="1800" b="0" i="0" u="none" strike="noStrike" baseline="0" dirty="0" err="1">
+                <a:solidFill>
+                  <a:srgbClr val="05297D"/>
+                </a:solidFill>
+                <a:latin typeface="SourceCodePro-Regular-Identity-H"/>
+              </a:rPr>
+              <a:t>Sqft</a:t>
+            </a:r>
+            <a:r>
+              <a:rPr lang="en-US" sz="1800" b="0" i="0" u="none" strike="noStrike" baseline="0" dirty="0">
+                <a:solidFill>
+                  <a:srgbClr val="05297D"/>
+                </a:solidFill>
+                <a:latin typeface="SourceCodePro-Regular-Identity-H"/>
+              </a:rPr>
+              <a:t>=</a:t>
+            </a:r>
+            <a:r>
+              <a:rPr lang="en-US" sz="1800" b="0" i="0" u="none" strike="noStrike" baseline="0" dirty="0" err="1">
+                <a:solidFill>
+                  <a:srgbClr val="05297D"/>
+                </a:solidFill>
+                <a:latin typeface="SourceCodePro-Regular-Identity-H"/>
+              </a:rPr>
+              <a:t>SqftLiving</a:t>
+            </a:r>
+            <a:r>
+              <a:rPr lang="en-US" sz="1800" b="0" i="0" u="none" strike="noStrike" baseline="0" dirty="0">
+                <a:solidFill>
+                  <a:srgbClr val="05297D"/>
+                </a:solidFill>
+                <a:latin typeface="SourceCodePro-Regular-Identity-H"/>
+              </a:rPr>
+              <a:t>) |&gt; </a:t>
+            </a:r>
+          </a:p>
+          <a:p>
+            <a:pPr marL="0" indent="0" algn="l">
+              <a:buNone/>
+            </a:pPr>
+            <a:r>
+              <a:rPr lang="en-US" sz="1800" b="0" i="0" u="none" strike="noStrike" baseline="0" dirty="0" err="1">
+                <a:solidFill>
+                  <a:srgbClr val="05297D"/>
+                </a:solidFill>
+                <a:latin typeface="SourceCodePro-Regular-Identity-H"/>
+              </a:rPr>
+              <a:t>sample_n</a:t>
+            </a:r>
+            <a:r>
+              <a:rPr lang="en-US" sz="1800" b="0" i="0" u="none" strike="noStrike" baseline="0" dirty="0">
+                <a:solidFill>
+                  <a:srgbClr val="05297D"/>
+                </a:solidFill>
+                <a:latin typeface="SourceCodePro-Regular-Identity-H"/>
+              </a:rPr>
+              <a:t>(10000)</a:t>
+            </a:r>
+          </a:p>
+          <a:p>
+            <a:pPr marL="0" indent="0" algn="l">
+              <a:buNone/>
+            </a:pPr>
+            <a:endParaRPr lang="en-US" sz="1800" dirty="0">
+              <a:solidFill>
+                <a:srgbClr val="05297D"/>
+              </a:solidFill>
+              <a:latin typeface="SourceCodePro-Regular-Identity-H"/>
+            </a:endParaRPr>
+          </a:p>
+          <a:p>
+            <a:pPr marL="0" indent="0" algn="l">
+              <a:buNone/>
+            </a:pPr>
+            <a:r>
+              <a:rPr lang="en-US" sz="1800" b="0" i="0" u="none" strike="noStrike" baseline="0" dirty="0" err="1">
+                <a:solidFill>
+                  <a:srgbClr val="05297D"/>
+                </a:solidFill>
+                <a:latin typeface="SourceCodePro-Regular-Identity-H"/>
+              </a:rPr>
+              <a:t>ggplot</a:t>
+            </a:r>
+            <a:r>
+              <a:rPr lang="en-US" sz="1800" b="0" i="0" u="none" strike="noStrike" baseline="0" dirty="0">
+                <a:solidFill>
+                  <a:srgbClr val="05297D"/>
+                </a:solidFill>
+                <a:latin typeface="SourceCodePro-Regular-Identity-H"/>
+              </a:rPr>
+              <a:t>(</a:t>
+            </a:r>
+            <a:r>
+              <a:rPr lang="en-US" sz="1800" b="0" i="0" u="none" strike="noStrike" baseline="0" dirty="0" err="1">
+                <a:solidFill>
+                  <a:srgbClr val="05297D"/>
+                </a:solidFill>
+                <a:latin typeface="SourceCodePro-Regular-Identity-H"/>
+              </a:rPr>
+              <a:t>DataHousing</a:t>
+            </a:r>
+            <a:r>
+              <a:rPr lang="en-US" sz="1800" b="0" i="0" u="none" strike="noStrike" baseline="0" dirty="0">
+                <a:solidFill>
+                  <a:srgbClr val="05297D"/>
+                </a:solidFill>
+                <a:latin typeface="SourceCodePro-Regular-Identity-H"/>
+              </a:rPr>
+              <a:t>, </a:t>
+            </a:r>
+            <a:r>
+              <a:rPr lang="en-US" sz="1800" b="0" i="0" u="none" strike="noStrike" baseline="0" dirty="0" err="1">
+                <a:solidFill>
+                  <a:srgbClr val="05297D"/>
+                </a:solidFill>
+                <a:latin typeface="SourceCodePro-Regular-Identity-H"/>
+              </a:rPr>
+              <a:t>aes</a:t>
+            </a:r>
+            <a:r>
+              <a:rPr lang="en-US" sz="1800" b="0" i="0" u="none" strike="noStrike" baseline="0" dirty="0">
+                <a:solidFill>
+                  <a:srgbClr val="05297D"/>
+                </a:solidFill>
+                <a:latin typeface="SourceCodePro-Regular-Identity-H"/>
+              </a:rPr>
+              <a:t>(x=</a:t>
+            </a:r>
+            <a:r>
+              <a:rPr lang="en-US" sz="1800" b="0" i="0" u="none" strike="noStrike" baseline="0" dirty="0" err="1">
+                <a:solidFill>
+                  <a:srgbClr val="05297D"/>
+                </a:solidFill>
+                <a:latin typeface="SourceCodePro-Regular-Identity-H"/>
+              </a:rPr>
+              <a:t>Sqft</a:t>
+            </a:r>
+            <a:r>
+              <a:rPr lang="en-US" sz="1800" b="0" i="0" u="none" strike="noStrike" baseline="0" dirty="0">
+                <a:solidFill>
+                  <a:srgbClr val="05297D"/>
+                </a:solidFill>
+                <a:latin typeface="SourceCodePro-Regular-Identity-H"/>
+              </a:rPr>
+              <a:t>, y=Price)) +</a:t>
+            </a:r>
+          </a:p>
+          <a:p>
+            <a:pPr marL="0" indent="0" algn="l">
+              <a:buNone/>
+            </a:pPr>
+            <a:r>
+              <a:rPr lang="en-US" sz="1800" b="0" i="0" u="none" strike="noStrike" baseline="0" dirty="0">
+                <a:solidFill>
+                  <a:srgbClr val="05297D"/>
+                </a:solidFill>
+                <a:latin typeface="SourceCodePro-Regular-Identity-H"/>
+              </a:rPr>
+              <a:t>labs(title="Correlation between </a:t>
+            </a:r>
+            <a:r>
+              <a:rPr lang="en-US" sz="1800" b="0" i="0" u="none" strike="noStrike" baseline="0" dirty="0" err="1">
+                <a:solidFill>
+                  <a:srgbClr val="05297D"/>
+                </a:solidFill>
+                <a:latin typeface="SourceCodePro-Regular-Identity-H"/>
+              </a:rPr>
+              <a:t>Sqft</a:t>
+            </a:r>
+            <a:r>
+              <a:rPr lang="en-US" sz="1800" b="0" i="0" u="none" strike="noStrike" baseline="0" dirty="0">
+                <a:solidFill>
+                  <a:srgbClr val="05297D"/>
+                </a:solidFill>
+                <a:latin typeface="SourceCodePro-Regular-Identity-H"/>
+              </a:rPr>
+              <a:t> and Price", x="</a:t>
+            </a:r>
+            <a:r>
+              <a:rPr lang="en-US" sz="1800" b="0" i="0" u="none" strike="noStrike" baseline="0" dirty="0" err="1">
+                <a:solidFill>
+                  <a:srgbClr val="05297D"/>
+                </a:solidFill>
+                <a:latin typeface="SourceCodePro-Regular-Identity-H"/>
+              </a:rPr>
+              <a:t>Sqft</a:t>
+            </a:r>
+            <a:r>
+              <a:rPr lang="en-US" sz="1800" b="0" i="0" u="none" strike="noStrike" baseline="0" dirty="0">
+                <a:solidFill>
+                  <a:srgbClr val="05297D"/>
+                </a:solidFill>
+                <a:latin typeface="SourceCodePro-Regular-Identity-H"/>
+              </a:rPr>
+              <a:t>",y="Price")+</a:t>
+            </a:r>
+          </a:p>
+          <a:p>
+            <a:pPr marL="0" indent="0" algn="l">
+              <a:buNone/>
+            </a:pPr>
+            <a:r>
+              <a:rPr lang="en-US" sz="1800" b="0" i="0" u="none" strike="noStrike" baseline="0" dirty="0" err="1">
+                <a:solidFill>
+                  <a:srgbClr val="05297D"/>
+                </a:solidFill>
+                <a:latin typeface="SourceCodePro-Regular-Identity-H"/>
+              </a:rPr>
+              <a:t>geom_point</a:t>
+            </a:r>
+            <a:r>
+              <a:rPr lang="en-US" sz="1800" b="0" i="0" u="none" strike="noStrike" baseline="0" dirty="0">
+                <a:solidFill>
+                  <a:srgbClr val="05297D"/>
+                </a:solidFill>
+                <a:latin typeface="SourceCodePro-Regular-Identity-H"/>
+              </a:rPr>
+              <a:t>()+</a:t>
+            </a:r>
+          </a:p>
+          <a:p>
+            <a:pPr marL="0" indent="0" algn="l">
+              <a:buNone/>
+            </a:pPr>
+            <a:r>
+              <a:rPr lang="en-US" sz="1800" b="0" i="0" u="none" strike="noStrike" baseline="0" dirty="0" err="1">
+                <a:solidFill>
+                  <a:srgbClr val="05297D"/>
+                </a:solidFill>
+                <a:latin typeface="SourceCodePro-Regular-Identity-H"/>
+              </a:rPr>
+              <a:t>geom_smooth</a:t>
+            </a:r>
+            <a:r>
+              <a:rPr lang="en-US" sz="1800" b="0" i="0" u="none" strike="noStrike" baseline="0" dirty="0">
+                <a:solidFill>
+                  <a:srgbClr val="05297D"/>
+                </a:solidFill>
+                <a:latin typeface="SourceCodePro-Regular-Identity-H"/>
+              </a:rPr>
+              <a:t>(method = "</a:t>
+            </a:r>
+            <a:r>
+              <a:rPr lang="en-US" sz="1800" b="0" i="0" u="none" strike="noStrike" baseline="0" dirty="0" err="1">
+                <a:solidFill>
+                  <a:srgbClr val="05297D"/>
+                </a:solidFill>
+                <a:latin typeface="SourceCodePro-Regular-Identity-H"/>
+              </a:rPr>
+              <a:t>lm</a:t>
+            </a:r>
+            <a:r>
+              <a:rPr lang="en-US" sz="1800" b="0" i="0" u="none" strike="noStrike" baseline="0" dirty="0">
+                <a:solidFill>
+                  <a:srgbClr val="05297D"/>
+                </a:solidFill>
+                <a:latin typeface="SourceCodePro-Regular-Identity-H"/>
+              </a:rPr>
+              <a:t>", se=FALSE)</a:t>
+            </a:r>
+            <a:endParaRPr lang="en-US" dirty="0"/>
+          </a:p>
+        </p:txBody>
+      </p:sp>
+      <p:sp>
+        <p:nvSpPr>
+          <p:cNvPr id="6" name="Slide Number Placeholder 5">
+            <a:extLst>
+              <a:ext uri="{FF2B5EF4-FFF2-40B4-BE49-F238E27FC236}">
+                <a16:creationId xmlns:a16="http://schemas.microsoft.com/office/drawing/2014/main" id="{32E2A852-83AD-D3EA-EDB9-7DDBC63F92AC}"/>
+              </a:ext>
+            </a:extLst>
+          </p:cNvPr>
           <p:cNvSpPr>
             <a:spLocks noGrp="1"/>
           </p:cNvSpPr>
@@ -6108,181 +6563,10 @@
           </a:p>
         </p:txBody>
       </p:sp>
-      <p:sp>
-        <p:nvSpPr>
-          <p:cNvPr id="4" name="Content Placeholder 3"/>
-          <p:cNvSpPr>
-            <a:spLocks noGrp="1"/>
-          </p:cNvSpPr>
-          <p:nvPr>
-            <p:ph sz="half" idx="2"/>
-          </p:nvPr>
-        </p:nvSpPr>
-        <p:spPr>
-          <a:xfrm>
-            <a:off x="838200" y="3600887"/>
-            <a:ext cx="10515600" cy="2340589"/>
-          </a:xfrm>
-        </p:spPr>
-        <p:txBody>
-          <a:bodyPr/>
-          <a:lstStyle/>
-          <a:p>
-            <a:pPr lvl="1">
-              <a:spcAft>
-                <a:spcPts val="600"/>
-              </a:spcAft>
-            </a:pPr>
-            <a:r>
-              <a:rPr lang="de-DE" altLang="en-US" sz="2600" dirty="0">
-                <a:ea typeface="ＭＳ Ｐゴシック" panose="020B0600070205080204" pitchFamily="34" charset="-128"/>
-                <a:cs typeface="Lucida Bright" panose="02040602050505020304" pitchFamily="18" charset="0"/>
-              </a:rPr>
-              <a:t>Ceteris paribus: “other relevant factors being equal.</a:t>
-            </a:r>
-            <a:r>
-              <a:rPr lang="en-US" sz="2600" dirty="0"/>
-              <a:t>”</a:t>
-            </a:r>
-          </a:p>
-          <a:p>
-            <a:pPr lvl="1">
-              <a:spcAft>
-                <a:spcPts val="600"/>
-              </a:spcAft>
-            </a:pPr>
-            <a:r>
-              <a:rPr lang="de-DE" altLang="en-US" sz="2600" dirty="0">
-                <a:ea typeface="ＭＳ Ｐゴシック" panose="020B0600070205080204" pitchFamily="34" charset="-128"/>
-                <a:cs typeface="Lucida Bright" panose="02040602050505020304" pitchFamily="18" charset="0"/>
-              </a:rPr>
-              <a:t>Most economic questions are ceteris paribus questions.</a:t>
-            </a:r>
-          </a:p>
-          <a:p>
-            <a:pPr lvl="1">
-              <a:spcAft>
-                <a:spcPts val="600"/>
-              </a:spcAft>
-            </a:pPr>
-            <a:r>
-              <a:rPr lang="de-DE" altLang="en-US" sz="2600" dirty="0">
-                <a:ea typeface="ＭＳ Ｐゴシック" panose="020B0600070205080204" pitchFamily="34" charset="-128"/>
-                <a:cs typeface="Lucida Bright" panose="02040602050505020304" pitchFamily="18" charset="0"/>
-              </a:rPr>
-              <a:t>It is important to define which causal effect one is interested in.</a:t>
-            </a:r>
-          </a:p>
-          <a:p>
-            <a:pPr lvl="1">
-              <a:spcAft>
-                <a:spcPts val="600"/>
-              </a:spcAft>
-            </a:pPr>
-            <a:r>
-              <a:rPr lang="de-DE" altLang="en-US" sz="2600" dirty="0">
-                <a:ea typeface="ＭＳ Ｐゴシック" panose="020B0600070205080204" pitchFamily="34" charset="-128"/>
-                <a:cs typeface="Lucida Bright" panose="02040602050505020304" pitchFamily="18" charset="0"/>
-              </a:rPr>
-              <a:t>It is useful to describe how an experiment would have to be designed to infer the causal effect in question</a:t>
-            </a:r>
-            <a:r>
-              <a:rPr lang="en-US" altLang="en-US" dirty="0">
-                <a:ea typeface="ＭＳ Ｐゴシック" panose="020B0600070205080204" pitchFamily="34" charset="-128"/>
-                <a:cs typeface="Lucida Bright" panose="02040602050505020304" pitchFamily="18" charset="0"/>
-              </a:rPr>
-              <a:t>.</a:t>
-            </a:r>
-            <a:endParaRPr lang="en-US" dirty="0"/>
-          </a:p>
-        </p:txBody>
-      </p:sp>
-      <p:pic>
-        <p:nvPicPr>
-          <p:cNvPr id="7" name="Picture 6" descr="Image of text.&#10;Definition of causal effect of x on y: &quot;How does variable x change if variable y is changed, but all other relevant factors are held constant?&quot;"/>
-          <p:cNvPicPr>
-            <a:picLocks noChangeAspect="1"/>
-          </p:cNvPicPr>
-          <p:nvPr/>
-        </p:nvPicPr>
-        <p:blipFill>
-          <a:blip r:embed="rId2"/>
-          <a:stretch>
-            <a:fillRect/>
-          </a:stretch>
-        </p:blipFill>
-        <p:spPr>
-          <a:xfrm>
-            <a:off x="2876802" y="2042934"/>
-            <a:ext cx="5962405" cy="1432684"/>
-          </a:xfrm>
-          <a:prstGeom prst="rect">
-            <a:avLst/>
-          </a:prstGeom>
-        </p:spPr>
-      </p:pic>
-      <p:sp>
-        <p:nvSpPr>
-          <p:cNvPr id="3" name="Content Placeholder 2"/>
-          <p:cNvSpPr>
-            <a:spLocks noGrp="1"/>
-          </p:cNvSpPr>
-          <p:nvPr>
-            <p:ph sz="half" idx="1"/>
-          </p:nvPr>
-        </p:nvSpPr>
-        <p:spPr>
-          <a:xfrm>
-            <a:off x="838200" y="1456029"/>
-            <a:ext cx="10515600" cy="498031"/>
-          </a:xfrm>
-        </p:spPr>
-        <p:txBody>
-          <a:bodyPr/>
-          <a:lstStyle/>
-          <a:p>
-            <a:r>
-              <a:rPr lang="de-DE" altLang="en-US" b="1" dirty="0">
-                <a:ea typeface="ＭＳ Ｐゴシック" panose="020B0600070205080204" pitchFamily="34" charset="-128"/>
-                <a:cs typeface="Lucida Bright" panose="02040602050505020304" pitchFamily="18" charset="0"/>
-              </a:rPr>
-              <a:t>Causality and the notion of ceteris paribus</a:t>
-            </a:r>
-            <a:endParaRPr lang="en-US" b="1" dirty="0"/>
-          </a:p>
-        </p:txBody>
-      </p:sp>
-      <p:sp>
-        <p:nvSpPr>
-          <p:cNvPr id="2" name="Title 1"/>
-          <p:cNvSpPr>
-            <a:spLocks noGrp="1"/>
-          </p:cNvSpPr>
-          <p:nvPr>
-            <p:ph type="title"/>
-          </p:nvPr>
-        </p:nvSpPr>
-        <p:spPr/>
-        <p:txBody>
-          <a:bodyPr/>
-          <a:lstStyle/>
-          <a:p>
-            <a:r>
-              <a:rPr lang="de-DE" altLang="en-US" dirty="0"/>
-              <a:t>The Nature of Econometrics and Economic Data </a:t>
-            </a:r>
-            <a:r>
-              <a:rPr lang="de-DE" altLang="en-US" sz="1600" dirty="0"/>
-              <a:t>(17 of 22)</a:t>
-            </a:r>
-            <a:endParaRPr lang="en-US" dirty="0"/>
-          </a:p>
-        </p:txBody>
-      </p:sp>
     </p:spTree>
     <p:extLst>
       <p:ext uri="{BB962C8B-B14F-4D97-AF65-F5344CB8AC3E}">
-        <p14:creationId xmlns:p14="http://schemas.microsoft.com/office/powerpoint/2010/main" val="113937254"/>
+        <p14:creationId xmlns:p14="http://schemas.microsoft.com/office/powerpoint/2010/main" val="126545722"/>
       </p:ext>
     </p:extLst>
   </p:cSld>
@@ -8433,7 +8717,7 @@
       </p:grpSpPr>
       <p:sp>
         <p:nvSpPr>
-          <p:cNvPr id="3" name="Slide Number Placeholder 2"/>
+          <p:cNvPr id="6" name="Slide Number Placeholder 5"/>
           <p:cNvSpPr>
             <a:spLocks noGrp="1"/>
           </p:cNvSpPr>
@@ -8456,46 +8740,23 @@
       </p:sp>
       <p:sp>
         <p:nvSpPr>
-          <p:cNvPr id="2" name="Content Placeholder 1"/>
+          <p:cNvPr id="4" name="Content Placeholder 3"/>
           <p:cNvSpPr>
             <a:spLocks noGrp="1"/>
           </p:cNvSpPr>
           <p:nvPr>
-            <p:ph idx="1"/>
+            <p:ph sz="half" idx="2"/>
           </p:nvPr>
         </p:nvSpPr>
-        <p:spPr/>
+        <p:spPr>
+          <a:xfrm>
+            <a:off x="838200" y="3600887"/>
+            <a:ext cx="10515600" cy="2340589"/>
+          </a:xfrm>
+        </p:spPr>
         <p:txBody>
           <a:bodyPr/>
           <a:lstStyle/>
-          <a:p>
-            <a:pPr>
-              <a:spcAft>
-                <a:spcPts val="600"/>
-              </a:spcAft>
-            </a:pPr>
-            <a:r>
-              <a:rPr lang="de-DE" altLang="en-US" b="1" dirty="0">
-                <a:ea typeface="ＭＳ Ｐゴシック" panose="020B0600070205080204" pitchFamily="34" charset="-128"/>
-                <a:cs typeface="Lucida Bright" panose="02040602050505020304" pitchFamily="18" charset="0"/>
-              </a:rPr>
-              <a:t>Econometric analysis requires data.</a:t>
-            </a:r>
-          </a:p>
-          <a:p>
-            <a:pPr>
-              <a:spcAft>
-                <a:spcPts val="600"/>
-              </a:spcAft>
-            </a:pPr>
-            <a:r>
-              <a:rPr lang="de-DE" altLang="en-US" dirty="0">
-                <a:ea typeface="ＭＳ Ｐゴシック" panose="020B0600070205080204" pitchFamily="34" charset="-128"/>
-                <a:cs typeface="Lucida Bright" panose="02040602050505020304" pitchFamily="18" charset="0"/>
-              </a:rPr>
-              <a:t>There are several different kinds of economic data sets:</a:t>
-            </a:r>
-          </a:p>
           <a:p>
             <a:pPr lvl="1">
               <a:spcAft>
@@ -8504,10 +8765,14 @@
             </a:pPr>
             <a:r>
               <a:rPr lang="de-DE" altLang="en-US" sz="2600" dirty="0">
-                <a:ea typeface="Arial" panose="020B0604020202020204" pitchFamily="34" charset="0"/>
-                <a:cs typeface="Lucida Bright" panose="02040602050505020304" pitchFamily="18" charset="0"/>
-              </a:rPr>
-              <a:t>Cross-sectional data</a:t>
+                <a:ea typeface="ＭＳ Ｐゴシック" panose="020B0600070205080204" pitchFamily="34" charset="-128"/>
+                <a:cs typeface="Lucida Bright" panose="02040602050505020304" pitchFamily="18" charset="0"/>
+              </a:rPr>
+              <a:t>Ceteris paribus: “other relevant factors being equal.</a:t>
+            </a:r>
+            <a:r>
+              <a:rPr lang="en-US" sz="2600" dirty="0"/>
+              <a:t>”</a:t>
             </a:r>
           </a:p>
           <a:p>
@@ -8518,10 +8783,10 @@
             </a:pPr>
             <a:r>
               <a:rPr lang="de-DE" altLang="en-US" sz="2600" dirty="0">
-                <a:ea typeface="Arial" panose="020B0604020202020204" pitchFamily="34" charset="0"/>
-                <a:cs typeface="Lucida Bright" panose="02040602050505020304" pitchFamily="18" charset="0"/>
-              </a:rPr>
-              <a:t>Time series data</a:t>
+                <a:ea typeface="ＭＳ Ｐゴシック" panose="020B0600070205080204" pitchFamily="34" charset="-128"/>
+                <a:cs typeface="Lucida Bright" panose="02040602050505020304" pitchFamily="18" charset="0"/>
+              </a:rPr>
+              <a:t>Most economic questions are ceteris paribus questions.</a:t>
             </a:r>
           </a:p>
           <a:p>
@@ -8532,10 +8797,10 @@
             </a:pPr>
             <a:r>
               <a:rPr lang="de-DE" altLang="en-US" sz="2600" dirty="0">
-                <a:ea typeface="Arial" panose="020B0604020202020204" pitchFamily="34" charset="0"/>
-                <a:cs typeface="Lucida Bright" panose="02040602050505020304" pitchFamily="18" charset="0"/>
-              </a:rPr>
-              <a:t>Panel/Longitudinal data</a:t>
+                <a:ea typeface="ＭＳ Ｐゴシック" panose="020B0600070205080204" pitchFamily="34" charset="-128"/>
+                <a:cs typeface="Lucida Bright" panose="02040602050505020304" pitchFamily="18" charset="0"/>
+              </a:rPr>
+              <a:t>It is important to define which causal effect one is interested in.</a:t>
             </a:r>
           </a:p>
           <a:p>
@@ -8544,53 +8809,82 @@
                 <a:spcPts val="600"/>
               </a:spcAft>
             </a:pPr>
-            <a:endParaRPr lang="de-DE" altLang="en-US" sz="2600" dirty="0">
-              <a:ea typeface="Arial" panose="020B0604020202020204" pitchFamily="34" charset="0"/>
-              <a:cs typeface="Lucida Bright" panose="02040602050505020304" pitchFamily="18" charset="0"/>
-            </a:endParaRPr>
-          </a:p>
-          <a:p>
-            <a:pPr>
-              <a:spcAft>
-                <a:spcPts val="600"/>
-              </a:spcAft>
-            </a:pPr>
-            <a:r>
-              <a:rPr lang="de-DE" altLang="en-US" dirty="0">
+            <a:r>
+              <a:rPr lang="de-DE" altLang="en-US" sz="2600" dirty="0">
                 <a:ea typeface="ＭＳ Ｐゴシック" panose="020B0600070205080204" pitchFamily="34" charset="-128"/>
                 <a:cs typeface="Lucida Bright" panose="02040602050505020304" pitchFamily="18" charset="0"/>
               </a:rPr>
-              <a:t>Econometric methods depend on the nature of the data used.</a:t>
-            </a:r>
-          </a:p>
-          <a:p>
-            <a:pPr lvl="1"/>
-            <a:r>
-              <a:rPr lang="de-DE" altLang="en-US" sz="2600" dirty="0">
-                <a:solidFill>
-                  <a:srgbClr val="FF0000"/>
-                </a:solidFill>
-                <a:ea typeface="Arial" panose="020B0604020202020204" pitchFamily="34" charset="0"/>
-                <a:cs typeface="Lucida Bright" panose="02040602050505020304" pitchFamily="18" charset="0"/>
-              </a:rPr>
-              <a:t>Use of inappropriate methods may lead to misleading </a:t>
-            </a:r>
-            <a:r>
-              <a:rPr lang="de-DE" altLang="en-US" sz="2600" dirty="0">
-                <a:ea typeface="Arial" panose="020B0604020202020204" pitchFamily="34" charset="0"/>
-                <a:cs typeface="Lucida Bright" panose="02040602050505020304" pitchFamily="18" charset="0"/>
-              </a:rPr>
-              <a:t>results.</a:t>
-            </a:r>
-          </a:p>
-          <a:p>
+              <a:t>It is useful to describe how an experiment would have to be designed to infer the causal effect in question</a:t>
+            </a:r>
+            <a:r>
+              <a:rPr lang="en-US" altLang="en-US" dirty="0">
+                <a:ea typeface="ＭＳ Ｐゴシック" panose="020B0600070205080204" pitchFamily="34" charset="-128"/>
+                <a:cs typeface="Lucida Bright" panose="02040602050505020304" pitchFamily="18" charset="0"/>
+              </a:rPr>
+              <a:t>.</a:t>
+            </a:r>
             <a:endParaRPr lang="en-US" dirty="0"/>
           </a:p>
         </p:txBody>
       </p:sp>
-      <p:sp>
-        <p:nvSpPr>
-          <p:cNvPr id="4" name="Title 3"/>
+      <p:pic>
+        <p:nvPicPr>
+          <p:cNvPr id="7" name="Picture 6" descr="Image of text.&#10;Definition of causal effect of x on y: &quot;How does variable x change if variable y is changed, but all other relevant factors are held constant?&quot;"/>
+          <p:cNvPicPr>
+            <a:picLocks noChangeAspect="1"/>
+          </p:cNvPicPr>
+          <p:nvPr/>
+        </p:nvPicPr>
+        <p:blipFill>
+          <a:blip r:embed="rId2"/>
+          <a:stretch>
+            <a:fillRect/>
+          </a:stretch>
+        </p:blipFill>
+        <p:spPr>
+          <a:xfrm>
+            <a:off x="2876802" y="2042934"/>
+            <a:ext cx="5962405" cy="1432684"/>
+          </a:xfrm>
+          <a:prstGeom prst="rect">
+            <a:avLst/>
+          </a:prstGeom>
+        </p:spPr>
+      </p:pic>
+      <p:sp>
+        <p:nvSpPr>
+          <p:cNvPr id="3" name="Content Placeholder 2"/>
+          <p:cNvSpPr>
+            <a:spLocks noGrp="1"/>
+          </p:cNvSpPr>
+          <p:nvPr>
+            <p:ph sz="half" idx="1"/>
+          </p:nvPr>
+        </p:nvSpPr>
+        <p:spPr>
+          <a:xfrm>
+            <a:off x="838200" y="1456029"/>
+            <a:ext cx="10515600" cy="498031"/>
+          </a:xfrm>
+        </p:spPr>
+        <p:txBody>
+          <a:bodyPr/>
+          <a:lstStyle/>
+          <a:p>
+            <a:r>
+              <a:rPr lang="de-DE" altLang="en-US" b="1" dirty="0">
+                <a:ea typeface="ＭＳ Ｐゴシック" panose="020B0600070205080204" pitchFamily="34" charset="-128"/>
+                <a:cs typeface="Lucida Bright" panose="02040602050505020304" pitchFamily="18" charset="0"/>
+              </a:rPr>
+              <a:t>Causality and the notion of ceteris paribus</a:t>
+            </a:r>
+            <a:endParaRPr lang="en-US" b="1" dirty="0"/>
+          </a:p>
+        </p:txBody>
+      </p:sp>
+      <p:sp>
+        <p:nvSpPr>
+          <p:cNvPr id="2" name="Title 1"/>
           <p:cNvSpPr>
             <a:spLocks noGrp="1"/>
           </p:cNvSpPr>
@@ -8609,7 +8903,7 @@
             </a:r>
             <a:r>
               <a:rPr lang="de-DE" altLang="en-US" sz="1600" dirty="0"/>
-              <a:t>(7 of 22)</a:t>
+              <a:t>(17 of 22)</a:t>
             </a:r>
             <a:endParaRPr lang="en-US" dirty="0"/>
           </a:p>
@@ -8618,7 +8912,7 @@
     </p:spTree>
     <p:extLst>
       <p:ext uri="{BB962C8B-B14F-4D97-AF65-F5344CB8AC3E}">
-        <p14:creationId xmlns:p14="http://schemas.microsoft.com/office/powerpoint/2010/main" val="4063706703"/>
+        <p14:creationId xmlns:p14="http://schemas.microsoft.com/office/powerpoint/2010/main" val="820470024"/>
       </p:ext>
     </p:extLst>
   </p:cSld>
@@ -8647,6 +8941,220 @@
       </p:grpSpPr>
       <p:sp>
         <p:nvSpPr>
+          <p:cNvPr id="3" name="Slide Number Placeholder 2"/>
+          <p:cNvSpPr>
+            <a:spLocks noGrp="1"/>
+          </p:cNvSpPr>
+          <p:nvPr>
+            <p:ph type="sldNum" sz="quarter" idx="12"/>
+          </p:nvPr>
+        </p:nvSpPr>
+        <p:spPr/>
+        <p:txBody>
+          <a:bodyPr/>
+          <a:lstStyle/>
+          <a:p>
+            <a:fld id="{949EBC64-41CB-41B8-B6DF-9B1367312BD4}" type="slidenum">
+              <a:rPr lang="en-US" smtClean="0"/>
+              <a:t>7</a:t>
+            </a:fld>
+            <a:endParaRPr lang="en-US"/>
+          </a:p>
+        </p:txBody>
+      </p:sp>
+      <p:sp>
+        <p:nvSpPr>
+          <p:cNvPr id="2" name="Content Placeholder 1"/>
+          <p:cNvSpPr>
+            <a:spLocks noGrp="1"/>
+          </p:cNvSpPr>
+          <p:nvPr>
+            <p:ph idx="1"/>
+          </p:nvPr>
+        </p:nvSpPr>
+        <p:spPr/>
+        <p:txBody>
+          <a:bodyPr/>
+          <a:lstStyle/>
+          <a:p>
+            <a:pPr>
+              <a:spcAft>
+                <a:spcPts val="600"/>
+              </a:spcAft>
+            </a:pPr>
+            <a:r>
+              <a:rPr lang="de-DE" altLang="en-US" b="1" dirty="0">
+                <a:ea typeface="ＭＳ Ｐゴシック" panose="020B0600070205080204" pitchFamily="34" charset="-128"/>
+                <a:cs typeface="Lucida Bright" panose="02040602050505020304" pitchFamily="18" charset="0"/>
+              </a:rPr>
+              <a:t>Econometric analysis requires data.</a:t>
+            </a:r>
+          </a:p>
+          <a:p>
+            <a:pPr>
+              <a:spcAft>
+                <a:spcPts val="600"/>
+              </a:spcAft>
+            </a:pPr>
+            <a:r>
+              <a:rPr lang="de-DE" altLang="en-US" dirty="0">
+                <a:ea typeface="ＭＳ Ｐゴシック" panose="020B0600070205080204" pitchFamily="34" charset="-128"/>
+                <a:cs typeface="Lucida Bright" panose="02040602050505020304" pitchFamily="18" charset="0"/>
+              </a:rPr>
+              <a:t>There are several different kinds of economic data sets:</a:t>
+            </a:r>
+          </a:p>
+          <a:p>
+            <a:pPr lvl="1">
+              <a:spcAft>
+                <a:spcPts val="600"/>
+              </a:spcAft>
+            </a:pPr>
+            <a:r>
+              <a:rPr lang="de-DE" altLang="en-US" sz="2600" dirty="0">
+                <a:ea typeface="Arial" panose="020B0604020202020204" pitchFamily="34" charset="0"/>
+                <a:cs typeface="Lucida Bright" panose="02040602050505020304" pitchFamily="18" charset="0"/>
+              </a:rPr>
+              <a:t>Cross-sectional data</a:t>
+            </a:r>
+          </a:p>
+          <a:p>
+            <a:pPr lvl="1">
+              <a:spcAft>
+                <a:spcPts val="600"/>
+              </a:spcAft>
+            </a:pPr>
+            <a:r>
+              <a:rPr lang="de-DE" altLang="en-US" sz="2600" dirty="0">
+                <a:ea typeface="Arial" panose="020B0604020202020204" pitchFamily="34" charset="0"/>
+                <a:cs typeface="Lucida Bright" panose="02040602050505020304" pitchFamily="18" charset="0"/>
+              </a:rPr>
+              <a:t>Time series data</a:t>
+            </a:r>
+          </a:p>
+          <a:p>
+            <a:pPr lvl="1">
+              <a:spcAft>
+                <a:spcPts val="600"/>
+              </a:spcAft>
+            </a:pPr>
+            <a:r>
+              <a:rPr lang="de-DE" altLang="en-US" sz="2600" dirty="0">
+                <a:ea typeface="Arial" panose="020B0604020202020204" pitchFamily="34" charset="0"/>
+                <a:cs typeface="Lucida Bright" panose="02040602050505020304" pitchFamily="18" charset="0"/>
+              </a:rPr>
+              <a:t>Panel/Longitudinal data</a:t>
+            </a:r>
+          </a:p>
+          <a:p>
+            <a:pPr lvl="1">
+              <a:spcAft>
+                <a:spcPts val="600"/>
+              </a:spcAft>
+            </a:pPr>
+            <a:endParaRPr lang="de-DE" altLang="en-US" sz="2600" dirty="0">
+              <a:ea typeface="Arial" panose="020B0604020202020204" pitchFamily="34" charset="0"/>
+              <a:cs typeface="Lucida Bright" panose="02040602050505020304" pitchFamily="18" charset="0"/>
+            </a:endParaRPr>
+          </a:p>
+          <a:p>
+            <a:pPr>
+              <a:spcAft>
+                <a:spcPts val="600"/>
+              </a:spcAft>
+            </a:pPr>
+            <a:r>
+              <a:rPr lang="de-DE" altLang="en-US" dirty="0">
+                <a:ea typeface="ＭＳ Ｐゴシック" panose="020B0600070205080204" pitchFamily="34" charset="-128"/>
+                <a:cs typeface="Lucida Bright" panose="02040602050505020304" pitchFamily="18" charset="0"/>
+              </a:rPr>
+              <a:t>Econometric methods depend on the nature of the data used.</a:t>
+            </a:r>
+          </a:p>
+          <a:p>
+            <a:pPr lvl="1"/>
+            <a:r>
+              <a:rPr lang="de-DE" altLang="en-US" sz="2600" dirty="0">
+                <a:solidFill>
+                  <a:srgbClr val="FF0000"/>
+                </a:solidFill>
+                <a:ea typeface="Arial" panose="020B0604020202020204" pitchFamily="34" charset="0"/>
+                <a:cs typeface="Lucida Bright" panose="02040602050505020304" pitchFamily="18" charset="0"/>
+              </a:rPr>
+              <a:t>Use of inappropriate methods may lead to misleading </a:t>
+            </a:r>
+            <a:r>
+              <a:rPr lang="de-DE" altLang="en-US" sz="2600" dirty="0">
+                <a:ea typeface="Arial" panose="020B0604020202020204" pitchFamily="34" charset="0"/>
+                <a:cs typeface="Lucida Bright" panose="02040602050505020304" pitchFamily="18" charset="0"/>
+              </a:rPr>
+              <a:t>results.</a:t>
+            </a:r>
+          </a:p>
+          <a:p>
+            <a:endParaRPr lang="en-US" dirty="0"/>
+          </a:p>
+        </p:txBody>
+      </p:sp>
+      <p:sp>
+        <p:nvSpPr>
+          <p:cNvPr id="4" name="Title 3"/>
+          <p:cNvSpPr>
+            <a:spLocks noGrp="1"/>
+          </p:cNvSpPr>
+          <p:nvPr>
+            <p:ph type="title"/>
+          </p:nvPr>
+        </p:nvSpPr>
+        <p:spPr/>
+        <p:txBody>
+          <a:bodyPr/>
+          <a:lstStyle/>
+          <a:p>
+            <a:r>
+              <a:rPr lang="de-DE" altLang="en-US" dirty="0"/>
+              <a:t>The Nature of Econometrics and Economic Data </a:t>
+            </a:r>
+            <a:r>
+              <a:rPr lang="de-DE" altLang="en-US" sz="1600" dirty="0"/>
+              <a:t>(7 of 22)</a:t>
+            </a:r>
+            <a:endParaRPr lang="en-US" dirty="0"/>
+          </a:p>
+        </p:txBody>
+      </p:sp>
+    </p:spTree>
+    <p:extLst>
+      <p:ext uri="{BB962C8B-B14F-4D97-AF65-F5344CB8AC3E}">
+        <p14:creationId xmlns:p14="http://schemas.microsoft.com/office/powerpoint/2010/main" val="4063706703"/>
+      </p:ext>
+    </p:extLst>
+  </p:cSld>
+  <p:clrMapOvr>
+    <a:masterClrMapping/>
+  </p:clrMapOvr>
+</p:sld>
+</file>
+
+<file path=ppt/slides/slide8.xml><?xml version="1.0" encoding="utf-8"?>
+<p:sld xmlns:a="http://schemas.openxmlformats.org/drawingml/2006/main" xmlns:r="http://schemas.openxmlformats.org/officeDocument/2006/relationships" xmlns:p="http://schemas.openxmlformats.org/presentationml/2006/main">
+  <p:cSld>
+    <p:spTree>
+      <p:nvGrpSpPr>
+        <p:cNvPr id="1" name=""/>
+        <p:cNvGrpSpPr/>
+        <p:nvPr/>
+      </p:nvGrpSpPr>
+      <p:grpSpPr>
+        <a:xfrm>
+          <a:off x="0" y="0"/>
+          <a:ext cx="0" cy="0"/>
+          <a:chOff x="0" y="0"/>
+          <a:chExt cx="0" cy="0"/>
+        </a:xfrm>
+      </p:grpSpPr>
+      <p:sp>
+        <p:nvSpPr>
           <p:cNvPr id="6" name="Slide Number Placeholder 8">
             <a:extLst>
               <a:ext uri="{FF2B5EF4-FFF2-40B4-BE49-F238E27FC236}">
@@ -8675,7 +9183,7 @@
             <a:fld id="{949EBC64-41CB-41B8-B6DF-9B1367312BD4}" type="slidenum">
               <a:rPr lang="en-US" noProof="0" smtClean="0"/>
               <a:pPr lvl="0"/>
-              <a:t>7</a:t>
+              <a:t>8</a:t>
             </a:fld>
             <a:endParaRPr lang="en-US" noProof="0"/>
           </a:p>
@@ -11059,7 +11567,7 @@
 </p:sld>
 </file>
 
-<file path=ppt/slides/slide8.xml><?xml version="1.0" encoding="utf-8"?>
+<file path=ppt/slides/slide9.xml><?xml version="1.0" encoding="utf-8"?>
 <p:sld xmlns:a="http://schemas.openxmlformats.org/drawingml/2006/main" xmlns:r="http://schemas.openxmlformats.org/officeDocument/2006/relationships" xmlns:p="http://schemas.openxmlformats.org/presentationml/2006/main">
   <p:cSld>
     <p:spTree>
@@ -11128,7 +11636,7 @@
           <a:p>
             <a:fld id="{949EBC64-41CB-41B8-B6DF-9B1367312BD4}" type="slidenum">
               <a:rPr lang="en-US" smtClean="0"/>
-              <a:t>8</a:t>
+              <a:t>9</a:t>
             </a:fld>
             <a:endParaRPr lang="en-US"/>
           </a:p>
@@ -11210,500 +11718,6 @@
     <p:extLst>
       <p:ext uri="{BB962C8B-B14F-4D97-AF65-F5344CB8AC3E}">
         <p14:creationId xmlns:p14="http://schemas.microsoft.com/office/powerpoint/2010/main" val="3346255088"/>
-      </p:ext>
-    </p:extLst>
-  </p:cSld>
-  <p:clrMapOvr>
-    <a:masterClrMapping/>
-  </p:clrMapOvr>
-</p:sld>
-</file>
-
-<file path=ppt/slides/slide9.xml><?xml version="1.0" encoding="utf-8"?>
-<p:sld xmlns:a="http://schemas.openxmlformats.org/drawingml/2006/main" xmlns:r="http://schemas.openxmlformats.org/officeDocument/2006/relationships" xmlns:p="http://schemas.openxmlformats.org/presentationml/2006/main">
-  <p:cSld>
-    <p:spTree>
-      <p:nvGrpSpPr>
-        <p:cNvPr id="1" name=""/>
-        <p:cNvGrpSpPr/>
-        <p:nvPr/>
-      </p:nvGrpSpPr>
-      <p:grpSpPr>
-        <a:xfrm>
-          <a:off x="0" y="0"/>
-          <a:ext cx="0" cy="0"/>
-          <a:chOff x="0" y="0"/>
-          <a:chExt cx="0" cy="0"/>
-        </a:xfrm>
-      </p:grpSpPr>
-      <p:sp>
-        <p:nvSpPr>
-          <p:cNvPr id="2" name="Title 1">
-            <a:extLst>
-              <a:ext uri="{FF2B5EF4-FFF2-40B4-BE49-F238E27FC236}">
-                <a16:creationId xmlns:a16="http://schemas.microsoft.com/office/drawing/2014/main" id="{BAEE0C04-A2D2-4995-749D-62DDB4AF8D8D}"/>
-              </a:ext>
-            </a:extLst>
-          </p:cNvPr>
-          <p:cNvSpPr>
-            <a:spLocks noGrp="1"/>
-          </p:cNvSpPr>
-          <p:nvPr>
-            <p:ph type="title"/>
-          </p:nvPr>
-        </p:nvSpPr>
-        <p:spPr/>
-        <p:txBody>
-          <a:bodyPr/>
-          <a:lstStyle/>
-          <a:p>
-            <a:r>
-              <a:rPr lang="en-US" dirty="0"/>
-              <a:t>Another Example</a:t>
-            </a:r>
-          </a:p>
-        </p:txBody>
-      </p:sp>
-      <p:sp>
-        <p:nvSpPr>
-          <p:cNvPr id="3" name="Content Placeholder 2">
-            <a:extLst>
-              <a:ext uri="{FF2B5EF4-FFF2-40B4-BE49-F238E27FC236}">
-                <a16:creationId xmlns:a16="http://schemas.microsoft.com/office/drawing/2014/main" id="{1995FF6D-1F05-00F0-9DF2-B5472C06F416}"/>
-              </a:ext>
-            </a:extLst>
-          </p:cNvPr>
-          <p:cNvSpPr>
-            <a:spLocks noGrp="1"/>
-          </p:cNvSpPr>
-          <p:nvPr>
-            <p:ph sz="half" idx="1"/>
-          </p:nvPr>
-        </p:nvSpPr>
-        <p:spPr/>
-        <p:txBody>
-          <a:bodyPr/>
-          <a:lstStyle/>
-          <a:p>
-            <a:pPr marL="0" indent="0" algn="l">
-              <a:buNone/>
-            </a:pPr>
-            <a:r>
-              <a:rPr lang="en-US" sz="1800" b="0" i="0" u="none" strike="noStrike" baseline="0" dirty="0">
-                <a:solidFill>
-                  <a:srgbClr val="05297D"/>
-                </a:solidFill>
-                <a:latin typeface="SourceCodePro-Regular-Identity-H"/>
-              </a:rPr>
-              <a:t>library(</a:t>
-            </a:r>
-            <a:r>
-              <a:rPr lang="en-US" sz="1800" b="0" i="0" u="none" strike="noStrike" baseline="0" dirty="0" err="1">
-                <a:solidFill>
-                  <a:srgbClr val="05297D"/>
-                </a:solidFill>
-                <a:latin typeface="SourceCodePro-Regular-Identity-H"/>
-              </a:rPr>
-              <a:t>tidyverse</a:t>
-            </a:r>
-            <a:r>
-              <a:rPr lang="en-US" sz="1800" b="0" i="0" u="none" strike="noStrike" baseline="0" dirty="0">
-                <a:solidFill>
-                  <a:srgbClr val="05297D"/>
-                </a:solidFill>
-                <a:latin typeface="SourceCodePro-Regular-Identity-H"/>
-              </a:rPr>
-              <a:t>);library(</a:t>
-            </a:r>
-            <a:r>
-              <a:rPr lang="en-US" sz="1800" b="0" i="0" u="none" strike="noStrike" baseline="0" dirty="0" err="1">
-                <a:solidFill>
-                  <a:srgbClr val="05297D"/>
-                </a:solidFill>
-                <a:latin typeface="SourceCodePro-Regular-Identity-H"/>
-              </a:rPr>
-              <a:t>rio</a:t>
-            </a:r>
-            <a:r>
-              <a:rPr lang="en-US" sz="1800" b="0" i="0" u="none" strike="noStrike" baseline="0" dirty="0">
-                <a:solidFill>
-                  <a:srgbClr val="05297D"/>
-                </a:solidFill>
-                <a:latin typeface="SourceCodePro-Regular-Identity-H"/>
-              </a:rPr>
-              <a:t>);library(janitor);  </a:t>
-            </a:r>
-            <a:r>
-              <a:rPr lang="en-US" sz="1800" b="0" i="0" u="none" strike="noStrike" baseline="0" dirty="0" err="1">
-                <a:solidFill>
-                  <a:srgbClr val="05297D"/>
-                </a:solidFill>
-                <a:latin typeface="SourceCodePro-Regular-Identity-H"/>
-              </a:rPr>
-              <a:t>DataHousing</a:t>
-            </a:r>
-            <a:r>
-              <a:rPr lang="en-US" sz="1800" b="0" i="0" u="none" strike="noStrike" baseline="0" dirty="0">
-                <a:solidFill>
-                  <a:srgbClr val="05297D"/>
-                </a:solidFill>
-                <a:latin typeface="SourceCodePro-Regular-Identity-H"/>
-              </a:rPr>
-              <a:t> =import("https://ai.lange-analytics.com/data/HousingData.csv") |&gt;</a:t>
-            </a:r>
-          </a:p>
-          <a:p>
-            <a:pPr marL="0" indent="0" algn="l">
-              <a:buNone/>
-            </a:pPr>
-            <a:r>
-              <a:rPr lang="en-US" sz="1800" b="0" i="0" u="none" strike="noStrike" baseline="0" dirty="0" err="1">
-                <a:solidFill>
-                  <a:srgbClr val="05297D"/>
-                </a:solidFill>
-                <a:latin typeface="SourceCodePro-Regular-Identity-H"/>
-              </a:rPr>
-              <a:t>clean_names</a:t>
-            </a:r>
-            <a:r>
-              <a:rPr lang="en-US" sz="1800" b="0" i="0" u="none" strike="noStrike" baseline="0" dirty="0">
-                <a:solidFill>
-                  <a:srgbClr val="05297D"/>
-                </a:solidFill>
-                <a:latin typeface="SourceCodePro-Regular-Identity-H"/>
-              </a:rPr>
-              <a:t>("</a:t>
-            </a:r>
-            <a:r>
-              <a:rPr lang="en-US" sz="1800" b="0" i="0" u="none" strike="noStrike" baseline="0" dirty="0" err="1">
-                <a:solidFill>
-                  <a:srgbClr val="05297D"/>
-                </a:solidFill>
-                <a:latin typeface="SourceCodePro-Regular-Identity-H"/>
-              </a:rPr>
-              <a:t>upper_camel</a:t>
-            </a:r>
-            <a:r>
-              <a:rPr lang="en-US" sz="1800" b="0" i="0" u="none" strike="noStrike" baseline="0" dirty="0">
-                <a:solidFill>
-                  <a:srgbClr val="05297D"/>
-                </a:solidFill>
-                <a:latin typeface="SourceCodePro-Regular-Identity-H"/>
-              </a:rPr>
-              <a:t>") |&gt;</a:t>
-            </a:r>
-          </a:p>
-          <a:p>
-            <a:pPr marL="0" indent="0" algn="l">
-              <a:buNone/>
-            </a:pPr>
-            <a:r>
-              <a:rPr lang="en-US" sz="1800" b="0" i="0" u="none" strike="noStrike" baseline="0" dirty="0">
-                <a:solidFill>
-                  <a:srgbClr val="05297D"/>
-                </a:solidFill>
-                <a:latin typeface="SourceCodePro-Regular-Identity-H"/>
-              </a:rPr>
-              <a:t>select(Price, </a:t>
-            </a:r>
-            <a:r>
-              <a:rPr lang="en-US" sz="1800" b="0" i="0" u="none" strike="noStrike" baseline="0" dirty="0" err="1">
-                <a:solidFill>
-                  <a:srgbClr val="05297D"/>
-                </a:solidFill>
-                <a:latin typeface="SourceCodePro-Regular-Identity-H"/>
-              </a:rPr>
-              <a:t>Sqft</a:t>
-            </a:r>
-            <a:r>
-              <a:rPr lang="en-US" sz="1800" b="0" i="0" u="none" strike="noStrike" baseline="0" dirty="0">
-                <a:solidFill>
-                  <a:srgbClr val="05297D"/>
-                </a:solidFill>
-                <a:latin typeface="SourceCodePro-Regular-Identity-H"/>
-              </a:rPr>
-              <a:t>=</a:t>
-            </a:r>
-            <a:r>
-              <a:rPr lang="en-US" sz="1800" b="0" i="0" u="none" strike="noStrike" baseline="0" dirty="0" err="1">
-                <a:solidFill>
-                  <a:srgbClr val="05297D"/>
-                </a:solidFill>
-                <a:latin typeface="SourceCodePro-Regular-Identity-H"/>
-              </a:rPr>
-              <a:t>SqftLiving</a:t>
-            </a:r>
-            <a:r>
-              <a:rPr lang="en-US" sz="1800" b="0" i="0" u="none" strike="noStrike" baseline="0" dirty="0">
-                <a:solidFill>
-                  <a:srgbClr val="05297D"/>
-                </a:solidFill>
-                <a:latin typeface="SourceCodePro-Regular-Identity-H"/>
-              </a:rPr>
-              <a:t>) |&gt; </a:t>
-            </a:r>
-          </a:p>
-          <a:p>
-            <a:pPr marL="0" indent="0" algn="l">
-              <a:buNone/>
-            </a:pPr>
-            <a:r>
-              <a:rPr lang="en-US" sz="1800" b="0" i="0" u="none" strike="noStrike" baseline="0" dirty="0" err="1">
-                <a:solidFill>
-                  <a:srgbClr val="05297D"/>
-                </a:solidFill>
-                <a:latin typeface="SourceCodePro-Regular-Identity-H"/>
-              </a:rPr>
-              <a:t>sample_n</a:t>
-            </a:r>
-            <a:r>
-              <a:rPr lang="en-US" sz="1800" b="0" i="0" u="none" strike="noStrike" baseline="0" dirty="0">
-                <a:solidFill>
-                  <a:srgbClr val="05297D"/>
-                </a:solidFill>
-                <a:latin typeface="SourceCodePro-Regular-Identity-H"/>
-              </a:rPr>
-              <a:t>(10000)</a:t>
-            </a:r>
-          </a:p>
-          <a:p>
-            <a:pPr marL="0" indent="0" algn="l">
-              <a:buNone/>
-            </a:pPr>
-            <a:endParaRPr lang="en-US" sz="1800" dirty="0">
-              <a:solidFill>
-                <a:srgbClr val="05297D"/>
-              </a:solidFill>
-              <a:latin typeface="SourceCodePro-Regular-Identity-H"/>
-            </a:endParaRPr>
-          </a:p>
-          <a:p>
-            <a:pPr marL="0" indent="0" algn="l">
-              <a:buNone/>
-            </a:pPr>
-            <a:r>
-              <a:rPr lang="en-US" sz="1800" b="0" i="0" u="none" strike="noStrike" baseline="0" dirty="0" err="1">
-                <a:solidFill>
-                  <a:srgbClr val="05297D"/>
-                </a:solidFill>
-                <a:latin typeface="SourceCodePro-Regular-Identity-H"/>
-              </a:rPr>
-              <a:t>ggplot</a:t>
-            </a:r>
-            <a:r>
-              <a:rPr lang="en-US" sz="1800" b="0" i="0" u="none" strike="noStrike" baseline="0" dirty="0">
-                <a:solidFill>
-                  <a:srgbClr val="05297D"/>
-                </a:solidFill>
-                <a:latin typeface="SourceCodePro-Regular-Identity-H"/>
-              </a:rPr>
-              <a:t>(</a:t>
-            </a:r>
-            <a:r>
-              <a:rPr lang="en-US" sz="1800" b="0" i="0" u="none" strike="noStrike" baseline="0" dirty="0" err="1">
-                <a:solidFill>
-                  <a:srgbClr val="05297D"/>
-                </a:solidFill>
-                <a:latin typeface="SourceCodePro-Regular-Identity-H"/>
-              </a:rPr>
-              <a:t>DataHousing</a:t>
-            </a:r>
-            <a:r>
-              <a:rPr lang="en-US" sz="1800" b="0" i="0" u="none" strike="noStrike" baseline="0" dirty="0">
-                <a:solidFill>
-                  <a:srgbClr val="05297D"/>
-                </a:solidFill>
-                <a:latin typeface="SourceCodePro-Regular-Identity-H"/>
-              </a:rPr>
-              <a:t>, </a:t>
-            </a:r>
-            <a:r>
-              <a:rPr lang="en-US" sz="1800" b="0" i="0" u="none" strike="noStrike" baseline="0" dirty="0" err="1">
-                <a:solidFill>
-                  <a:srgbClr val="05297D"/>
-                </a:solidFill>
-                <a:latin typeface="SourceCodePro-Regular-Identity-H"/>
-              </a:rPr>
-              <a:t>aes</a:t>
-            </a:r>
-            <a:r>
-              <a:rPr lang="en-US" sz="1800" b="0" i="0" u="none" strike="noStrike" baseline="0" dirty="0">
-                <a:solidFill>
-                  <a:srgbClr val="05297D"/>
-                </a:solidFill>
-                <a:latin typeface="SourceCodePro-Regular-Identity-H"/>
-              </a:rPr>
-              <a:t>(x=</a:t>
-            </a:r>
-            <a:r>
-              <a:rPr lang="en-US" sz="1800" b="0" i="0" u="none" strike="noStrike" baseline="0" dirty="0" err="1">
-                <a:solidFill>
-                  <a:srgbClr val="05297D"/>
-                </a:solidFill>
-                <a:latin typeface="SourceCodePro-Regular-Identity-H"/>
-              </a:rPr>
-              <a:t>Sqft</a:t>
-            </a:r>
-            <a:r>
-              <a:rPr lang="en-US" sz="1800" b="0" i="0" u="none" strike="noStrike" baseline="0" dirty="0">
-                <a:solidFill>
-                  <a:srgbClr val="05297D"/>
-                </a:solidFill>
-                <a:latin typeface="SourceCodePro-Regular-Identity-H"/>
-              </a:rPr>
-              <a:t>, y=Price)) +</a:t>
-            </a:r>
-          </a:p>
-          <a:p>
-            <a:pPr marL="0" indent="0" algn="l">
-              <a:buNone/>
-            </a:pPr>
-            <a:r>
-              <a:rPr lang="en-US" sz="1800" b="0" i="0" u="none" strike="noStrike" baseline="0" dirty="0">
-                <a:solidFill>
-                  <a:srgbClr val="05297D"/>
-                </a:solidFill>
-                <a:latin typeface="SourceCodePro-Regular-Identity-H"/>
-              </a:rPr>
-              <a:t>labs(title="Correlation between </a:t>
-            </a:r>
-            <a:r>
-              <a:rPr lang="en-US" sz="1800" b="0" i="0" u="none" strike="noStrike" baseline="0" dirty="0" err="1">
-                <a:solidFill>
-                  <a:srgbClr val="05297D"/>
-                </a:solidFill>
-                <a:latin typeface="SourceCodePro-Regular-Identity-H"/>
-              </a:rPr>
-              <a:t>Sqft</a:t>
-            </a:r>
-            <a:r>
-              <a:rPr lang="en-US" sz="1800" b="0" i="0" u="none" strike="noStrike" baseline="0" dirty="0">
-                <a:solidFill>
-                  <a:srgbClr val="05297D"/>
-                </a:solidFill>
-                <a:latin typeface="SourceCodePro-Regular-Identity-H"/>
-              </a:rPr>
-              <a:t> and Price", x="</a:t>
-            </a:r>
-            <a:r>
-              <a:rPr lang="en-US" sz="1800" b="0" i="0" u="none" strike="noStrike" baseline="0" dirty="0" err="1">
-                <a:solidFill>
-                  <a:srgbClr val="05297D"/>
-                </a:solidFill>
-                <a:latin typeface="SourceCodePro-Regular-Identity-H"/>
-              </a:rPr>
-              <a:t>Sqft</a:t>
-            </a:r>
-            <a:r>
-              <a:rPr lang="en-US" sz="1800" b="0" i="0" u="none" strike="noStrike" baseline="0" dirty="0">
-                <a:solidFill>
-                  <a:srgbClr val="05297D"/>
-                </a:solidFill>
-                <a:latin typeface="SourceCodePro-Regular-Identity-H"/>
-              </a:rPr>
-              <a:t>",y="Price")+</a:t>
-            </a:r>
-          </a:p>
-          <a:p>
-            <a:pPr marL="0" indent="0" algn="l">
-              <a:buNone/>
-            </a:pPr>
-            <a:r>
-              <a:rPr lang="en-US" sz="1800" b="0" i="0" u="none" strike="noStrike" baseline="0" dirty="0" err="1">
-                <a:solidFill>
-                  <a:srgbClr val="05297D"/>
-                </a:solidFill>
-                <a:latin typeface="SourceCodePro-Regular-Identity-H"/>
-              </a:rPr>
-              <a:t>geom_point</a:t>
-            </a:r>
-            <a:r>
-              <a:rPr lang="en-US" sz="1800" b="0" i="0" u="none" strike="noStrike" baseline="0" dirty="0">
-                <a:solidFill>
-                  <a:srgbClr val="05297D"/>
-                </a:solidFill>
-                <a:latin typeface="SourceCodePro-Regular-Identity-H"/>
-              </a:rPr>
-              <a:t>()+</a:t>
-            </a:r>
-          </a:p>
-          <a:p>
-            <a:pPr marL="0" indent="0" algn="l">
-              <a:buNone/>
-            </a:pPr>
-            <a:r>
-              <a:rPr lang="en-US" sz="1800" b="0" i="0" u="none" strike="noStrike" baseline="0" dirty="0" err="1">
-                <a:solidFill>
-                  <a:srgbClr val="05297D"/>
-                </a:solidFill>
-                <a:latin typeface="SourceCodePro-Regular-Identity-H"/>
-              </a:rPr>
-              <a:t>geom_smooth</a:t>
-            </a:r>
-            <a:r>
-              <a:rPr lang="en-US" sz="1800" b="0" i="0" u="none" strike="noStrike" baseline="0" dirty="0">
-                <a:solidFill>
-                  <a:srgbClr val="05297D"/>
-                </a:solidFill>
-                <a:latin typeface="SourceCodePro-Regular-Identity-H"/>
-              </a:rPr>
-              <a:t>(method = "</a:t>
-            </a:r>
-            <a:r>
-              <a:rPr lang="en-US" sz="1800" b="0" i="0" u="none" strike="noStrike" baseline="0" dirty="0" err="1">
-                <a:solidFill>
-                  <a:srgbClr val="05297D"/>
-                </a:solidFill>
-                <a:latin typeface="SourceCodePro-Regular-Identity-H"/>
-              </a:rPr>
-              <a:t>lm</a:t>
-            </a:r>
-            <a:r>
-              <a:rPr lang="en-US" sz="1800" b="0" i="0" u="none" strike="noStrike" baseline="0" dirty="0">
-                <a:solidFill>
-                  <a:srgbClr val="05297D"/>
-                </a:solidFill>
-                <a:latin typeface="SourceCodePro-Regular-Identity-H"/>
-              </a:rPr>
-              <a:t>", se=FALSE)</a:t>
-            </a:r>
-            <a:endParaRPr lang="en-US" dirty="0"/>
-          </a:p>
-        </p:txBody>
-      </p:sp>
-      <p:sp>
-        <p:nvSpPr>
-          <p:cNvPr id="6" name="Slide Number Placeholder 5">
-            <a:extLst>
-              <a:ext uri="{FF2B5EF4-FFF2-40B4-BE49-F238E27FC236}">
-                <a16:creationId xmlns:a16="http://schemas.microsoft.com/office/drawing/2014/main" id="{32E2A852-83AD-D3EA-EDB9-7DDBC63F92AC}"/>
-              </a:ext>
-            </a:extLst>
-          </p:cNvPr>
-          <p:cNvSpPr>
-            <a:spLocks noGrp="1"/>
-          </p:cNvSpPr>
-          <p:nvPr>
-            <p:ph type="sldNum" sz="quarter" idx="12"/>
-          </p:nvPr>
-        </p:nvSpPr>
-        <p:spPr/>
-        <p:txBody>
-          <a:bodyPr/>
-          <a:lstStyle/>
-          <a:p>
-            <a:fld id="{949EBC64-41CB-41B8-B6DF-9B1367312BD4}" type="slidenum">
-              <a:rPr lang="en-US" smtClean="0"/>
-              <a:t>9</a:t>
-            </a:fld>
-            <a:endParaRPr lang="en-US"/>
-          </a:p>
-        </p:txBody>
-      </p:sp>
-    </p:spTree>
-    <p:extLst>
-      <p:ext uri="{BB962C8B-B14F-4D97-AF65-F5344CB8AC3E}">
-        <p14:creationId xmlns:p14="http://schemas.microsoft.com/office/powerpoint/2010/main" val="126545722"/>
       </p:ext>
     </p:extLst>
   </p:cSld>

</xml_diff>